<commit_message>
Layout and translate button
</commit_message>
<xml_diff>
--- a/MediaTinLanh.UI.WPF/temp/temp.pptx
+++ b/MediaTinLanh.UI.WPF/temp/temp.pptx
@@ -3317,7 +3317,7 @@
                   <a:srgbClr val="FFFFFF"/>
                 </a:solidFill>
               </a:rPr>
-              <a:t>dsaf </a:t>
+              <a:t>ad wda</a:t>
             </a:r>
           </a:p>
         </p:txBody>
@@ -3423,8 +3423,8 @@
                 </a:solidFill>
                 <a:latin typeface="Arial"/>
               </a:rPr>
-              <a:t>asdfdf
-adfdfasdf</a:t>
+              <a:t>awda aw dwadawd
+awd wad</a:t>
             </a:r>
           </a:p>
         </p:txBody>

</xml_diff>